<commit_message>
Lo and behold: it is a poster!
</commit_message>
<xml_diff>
--- a/conference/katy pnom 16.pptx
+++ b/conference/katy pnom 16.pptx
@@ -148,7 +148,7 @@
   </p:defaultTextStyle>
   <p:extLst>
     <p:ext uri="{EFAFB233-063F-42B5-8137-9DF3F51BA10A}">
-      <p15:sldGuideLst xmlns:p15="http://schemas.microsoft.com/office/powerpoint/2012/main">
+      <p15:sldGuideLst xmlns:p15="http://schemas.microsoft.com/office/powerpoint/2012/main" xmlns="">
         <p15:guide id="1" orient="horz" pos="10368">
           <p15:clr>
             <a:srgbClr val="A4A3A4"/>
@@ -248,7 +248,7 @@
             <a:fld id="{FD943D7A-167B-4D1B-8238-B31E320746FF}" type="datetimeFigureOut">
               <a:rPr lang="en-US"/>
               <a:pPr/>
-              <a:t>11/15/16</a:t>
+              <a:t>3/30/19</a:t>
             </a:fld>
             <a:endParaRPr lang="en-US"/>
           </a:p>
@@ -732,7 +732,7 @@
           <a:p>
             <a:fld id="{663379F8-D3CD-4F84-8ABE-D8B7DBD32689}" type="datetimeFigureOut">
               <a:rPr lang="en-US" smtClean="0"/>
-              <a:t>11/15/16</a:t>
+              <a:t>3/30/19</a:t>
             </a:fld>
             <a:endParaRPr lang="en-US"/>
           </a:p>
@@ -903,7 +903,7 @@
           <a:p>
             <a:fld id="{663379F8-D3CD-4F84-8ABE-D8B7DBD32689}" type="datetimeFigureOut">
               <a:rPr lang="en-US" smtClean="0"/>
-              <a:t>11/15/16</a:t>
+              <a:t>3/30/19</a:t>
             </a:fld>
             <a:endParaRPr lang="en-US"/>
           </a:p>
@@ -1084,7 +1084,7 @@
           <a:p>
             <a:fld id="{663379F8-D3CD-4F84-8ABE-D8B7DBD32689}" type="datetimeFigureOut">
               <a:rPr lang="en-US" smtClean="0"/>
-              <a:t>11/15/16</a:t>
+              <a:t>3/30/19</a:t>
             </a:fld>
             <a:endParaRPr lang="en-US"/>
           </a:p>
@@ -1255,7 +1255,7 @@
           <a:p>
             <a:fld id="{663379F8-D3CD-4F84-8ABE-D8B7DBD32689}" type="datetimeFigureOut">
               <a:rPr lang="en-US" smtClean="0"/>
-              <a:t>11/15/16</a:t>
+              <a:t>3/30/19</a:t>
             </a:fld>
             <a:endParaRPr lang="en-US"/>
           </a:p>
@@ -1500,7 +1500,7 @@
           <a:p>
             <a:fld id="{663379F8-D3CD-4F84-8ABE-D8B7DBD32689}" type="datetimeFigureOut">
               <a:rPr lang="en-US" smtClean="0"/>
-              <a:t>11/15/16</a:t>
+              <a:t>3/30/19</a:t>
             </a:fld>
             <a:endParaRPr lang="en-US"/>
           </a:p>
@@ -1733,7 +1733,7 @@
           <a:p>
             <a:fld id="{663379F8-D3CD-4F84-8ABE-D8B7DBD32689}" type="datetimeFigureOut">
               <a:rPr lang="en-US" smtClean="0"/>
-              <a:t>11/15/16</a:t>
+              <a:t>3/30/19</a:t>
             </a:fld>
             <a:endParaRPr lang="en-US"/>
           </a:p>
@@ -2101,7 +2101,7 @@
           <a:p>
             <a:fld id="{663379F8-D3CD-4F84-8ABE-D8B7DBD32689}" type="datetimeFigureOut">
               <a:rPr lang="en-US" smtClean="0"/>
-              <a:t>11/15/16</a:t>
+              <a:t>3/30/19</a:t>
             </a:fld>
             <a:endParaRPr lang="en-US"/>
           </a:p>
@@ -2220,7 +2220,7 @@
           <a:p>
             <a:fld id="{663379F8-D3CD-4F84-8ABE-D8B7DBD32689}" type="datetimeFigureOut">
               <a:rPr lang="en-US" smtClean="0"/>
-              <a:t>11/15/16</a:t>
+              <a:t>3/30/19</a:t>
             </a:fld>
             <a:endParaRPr lang="en-US"/>
           </a:p>
@@ -2316,7 +2316,7 @@
           <a:p>
             <a:fld id="{663379F8-D3CD-4F84-8ABE-D8B7DBD32689}" type="datetimeFigureOut">
               <a:rPr lang="en-US" smtClean="0"/>
-              <a:t>11/15/16</a:t>
+              <a:t>3/30/19</a:t>
             </a:fld>
             <a:endParaRPr lang="en-US"/>
           </a:p>
@@ -2594,7 +2594,7 @@
           <a:p>
             <a:fld id="{663379F8-D3CD-4F84-8ABE-D8B7DBD32689}" type="datetimeFigureOut">
               <a:rPr lang="en-US" smtClean="0"/>
-              <a:t>11/15/16</a:t>
+              <a:t>3/30/19</a:t>
             </a:fld>
             <a:endParaRPr lang="en-US"/>
           </a:p>
@@ -2852,7 +2852,7 @@
           <a:p>
             <a:fld id="{663379F8-D3CD-4F84-8ABE-D8B7DBD32689}" type="datetimeFigureOut">
               <a:rPr lang="en-US" smtClean="0"/>
-              <a:t>11/15/16</a:t>
+              <a:t>3/30/19</a:t>
             </a:fld>
             <a:endParaRPr lang="en-US"/>
           </a:p>
@@ -3066,7 +3066,7 @@
           <a:p>
             <a:fld id="{663379F8-D3CD-4F84-8ABE-D8B7DBD32689}" type="datetimeFigureOut">
               <a:rPr lang="en-US" smtClean="0"/>
-              <a:t>11/15/16</a:t>
+              <a:t>3/30/19</a:t>
             </a:fld>
             <a:endParaRPr lang="en-US"/>
           </a:p>
@@ -3648,7 +3648,7 @@
                 <a:cs typeface="Times New Roman"/>
                 <a:sym typeface="Minion Pro" pitchFamily="18" charset="0"/>
               </a:rPr>
-              <a:t>Metacognitive Awareness and Judgments of Learning in Statistics Courses</a:t>
+              <a:t>Moral Foundations of Political News Organizations</a:t>
             </a:r>
             <a:endParaRPr lang="en-US" sz="6000" b="1" dirty="0" smtClean="0">
               <a:solidFill>
@@ -3670,11 +3670,8 @@
                 <a:cs typeface="Times New Roman"/>
                 <a:sym typeface="Minion Pro" pitchFamily="18" charset="0"/>
               </a:rPr>
-              <a:t>Erin M. Buchanan, Katherine D. Miller, Emily R. Klug, and the DOOM Lab</a:t>
-            </a:r>
-          </a:p>
-          <a:p>
-            <a:pPr algn="ctr" eaLnBrk="1" hangingPunct="1"/>
+              <a:t>William E. Padfield and Erin </a:t>
+            </a:r>
             <a:r>
               <a:rPr lang="en-US" sz="6000" dirty="0" smtClean="0">
                 <a:solidFill>
@@ -3685,7 +3682,46 @@
                 <a:cs typeface="Times New Roman"/>
                 <a:sym typeface="Minion Pro" pitchFamily="18" charset="0"/>
               </a:rPr>
-              <a:t>Missouri State University</a:t>
+              <a:t>M. </a:t>
+            </a:r>
+            <a:r>
+              <a:rPr lang="en-US" sz="6000" dirty="0" smtClean="0">
+                <a:solidFill>
+                  <a:schemeClr val="bg1"/>
+                </a:solidFill>
+                <a:latin typeface="Times New Roman"/>
+                <a:ea typeface="MS PGothic" panose="020B0600070205080204" pitchFamily="34" charset="-128"/>
+                <a:cs typeface="Times New Roman"/>
+                <a:sym typeface="Minion Pro" pitchFamily="18" charset="0"/>
+              </a:rPr>
+              <a:t>Buchanan</a:t>
+            </a:r>
+          </a:p>
+          <a:p>
+            <a:pPr algn="ctr" eaLnBrk="1" hangingPunct="1"/>
+            <a:r>
+              <a:rPr lang="en-US" sz="6000" dirty="0" smtClean="0">
+                <a:solidFill>
+                  <a:schemeClr val="bg1"/>
+                </a:solidFill>
+                <a:latin typeface="Times New Roman"/>
+                <a:ea typeface="MS PGothic" panose="020B0600070205080204" pitchFamily="34" charset="-128"/>
+                <a:cs typeface="Times New Roman"/>
+                <a:sym typeface="Minion Pro" pitchFamily="18" charset="0"/>
+              </a:rPr>
+              <a:t>Missouri </a:t>
+            </a:r>
+            <a:r>
+              <a:rPr lang="en-US" sz="6000" dirty="0" smtClean="0">
+                <a:solidFill>
+                  <a:schemeClr val="bg1"/>
+                </a:solidFill>
+                <a:latin typeface="Times New Roman"/>
+                <a:ea typeface="MS PGothic" panose="020B0600070205080204" pitchFamily="34" charset="-128"/>
+                <a:cs typeface="Times New Roman"/>
+                <a:sym typeface="Minion Pro" pitchFamily="18" charset="0"/>
+              </a:rPr>
+              <a:t>State University</a:t>
             </a:r>
             <a:endParaRPr lang="en-US" sz="6000" dirty="0">
               <a:solidFill>
@@ -3721,7 +3757,7 @@
           </a:ln>
           <a:extLst>
             <a:ext uri="{909E8E84-426E-40dd-AFC4-6F175D3DCCD1}">
-              <a14:hiddenFill xmlns="" xmlns:a14="http://schemas.microsoft.com/office/drawing/2010/main">
+              <a14:hiddenFill xmlns:a14="http://schemas.microsoft.com/office/drawing/2010/main">
                 <a:noFill/>
               </a14:hiddenFill>
             </a:ext>
@@ -3771,7 +3807,7 @@
           </a:ln>
           <a:extLst>
             <a:ext uri="{909E8E84-426E-40dd-AFC4-6F175D3DCCD1}">
-              <a14:hiddenFill xmlns="" xmlns:a14="http://schemas.microsoft.com/office/drawing/2010/main">
+              <a14:hiddenFill xmlns:a14="http://schemas.microsoft.com/office/drawing/2010/main">
                 <a:noFill/>
               </a14:hiddenFill>
             </a:ext>
@@ -3821,7 +3857,7 @@
           </a:ln>
           <a:extLst>
             <a:ext uri="{909E8E84-426E-40dd-AFC4-6F175D3DCCD1}">
-              <a14:hiddenFill xmlns="" xmlns:a14="http://schemas.microsoft.com/office/drawing/2010/main">
+              <a14:hiddenFill xmlns:a14="http://schemas.microsoft.com/office/drawing/2010/main">
                 <a:noFill/>
               </a14:hiddenFill>
             </a:ext>
@@ -3871,14 +3907,14 @@
           </a:ln>
           <a:extLst>
             <a:ext uri="{909E8E84-426E-40dd-AFC4-6F175D3DCCD1}">
-              <a14:hiddenFill xmlns="" xmlns:a14="http://schemas.microsoft.com/office/drawing/2010/main">
+              <a14:hiddenFill xmlns:a14="http://schemas.microsoft.com/office/drawing/2010/main">
                 <a:solidFill>
                   <a:srgbClr val="FFFFFF"/>
                 </a:solidFill>
               </a14:hiddenFill>
             </a:ext>
             <a:ext uri="{91240B29-F687-4f45-9708-019B960494DF}">
-              <a14:hiddenLine xmlns="" xmlns:a14="http://schemas.microsoft.com/office/drawing/2010/main" w="12700" cap="rnd">
+              <a14:hiddenLine xmlns:a14="http://schemas.microsoft.com/office/drawing/2010/main" w="12700" cap="rnd">
                 <a:solidFill>
                   <a:schemeClr val="tx1"/>
                 </a:solidFill>
@@ -4031,7 +4067,14 @@
                 <a:latin typeface="Times New Roman"/>
                 <a:cs typeface="Times New Roman"/>
               </a:rPr>
-              <a:t>Judgments of Learning (JOLs) are included in the field of metacognitive research. This field is rich in terms of defining what and how students make JOLs, but is lacking in terms of understanding these judgments in the scope of domain specificity. The understanding of JOLs in statistics, both in declarative (fact-based questions) and procedural (skills based questions) knowledge, needs to be expanded upon. We hypothesized that metacognitive awareness, GPA, and previous statistical experience will be significant covariates of the relationship between JOL and test performance. Additionally, it is believed that there will be a significant difference in JOLs on types of knowledge, and we expected that JOLs will change across the semester. </a:t>
+              <a:t>The media ecosystem has grown, and political opinions have diverged such that there are competing conceptions of objective truth. Commentators often point to political biases in news coverage as a catalyst for this political divide. The Moral Foundations Dictionary (MFD) facilitates identification of ideological leanings in text through frequency of the occurrence of certain words. Through web scraping, the researchers extracted articles from popular news sources’ websites, calculated MFD word frequencies, and identified words’ respective valences. This process attempts to uncover news outlets’ positive or negative endorsements of certain moral dimensions concomitant with a particular ideology. The researchers gathered political articles from four sources</a:t>
+            </a:r>
+            <a:r>
+              <a:rPr lang="en-US" sz="3600" dirty="0" smtClean="0">
+                <a:latin typeface="Times New Roman"/>
+                <a:cs typeface="Times New Roman"/>
+              </a:rPr>
+              <a:t>. They were unable to reveal significant differences in moral or political endorsements, but they solidified the method for future research.</a:t>
             </a:r>
             <a:endParaRPr lang="en-US" sz="3600" dirty="0" smtClean="0">
               <a:solidFill>
@@ -4074,14 +4117,14 @@
           </a:ln>
           <a:extLst>
             <a:ext uri="{909E8E84-426E-40dd-AFC4-6F175D3DCCD1}">
-              <a14:hiddenFill xmlns="" xmlns:a14="http://schemas.microsoft.com/office/drawing/2010/main">
+              <a14:hiddenFill xmlns:a14="http://schemas.microsoft.com/office/drawing/2010/main">
                 <a:solidFill>
                   <a:srgbClr val="FFFFFF"/>
                 </a:solidFill>
               </a14:hiddenFill>
             </a:ext>
             <a:ext uri="{91240B29-F687-4f45-9708-019B960494DF}">
-              <a14:hiddenLine xmlns="" xmlns:a14="http://schemas.microsoft.com/office/drawing/2010/main" w="12700" cap="rnd">
+              <a14:hiddenLine xmlns:a14="http://schemas.microsoft.com/office/drawing/2010/main" w="12700" cap="rnd">
                 <a:solidFill>
                   <a:schemeClr val="tx1"/>
                 </a:solidFill>
@@ -4242,7 +4285,7 @@
         </p:nvSpPr>
         <p:spPr bwMode="auto">
           <a:xfrm>
-            <a:off x="2138218" y="12159545"/>
+            <a:off x="2133600" y="13759746"/>
             <a:ext cx="13258800" cy="19158654"/>
           </a:xfrm>
           <a:prstGeom prst="rect">
@@ -4254,14 +4297,14 @@
           </a:ln>
           <a:extLst>
             <a:ext uri="{909E8E84-426E-40dd-AFC4-6F175D3DCCD1}">
-              <a14:hiddenFill xmlns="" xmlns:a14="http://schemas.microsoft.com/office/drawing/2010/main">
+              <a14:hiddenFill xmlns:a14="http://schemas.microsoft.com/office/drawing/2010/main">
                 <a:solidFill>
                   <a:srgbClr val="FFFFFF"/>
                 </a:solidFill>
               </a14:hiddenFill>
             </a:ext>
             <a:ext uri="{91240B29-F687-4f45-9708-019B960494DF}">
-              <a14:hiddenLine xmlns="" xmlns:a14="http://schemas.microsoft.com/office/drawing/2010/main" w="12700" cap="rnd">
+              <a14:hiddenLine xmlns:a14="http://schemas.microsoft.com/office/drawing/2010/main" w="12700" cap="rnd">
                 <a:solidFill>
                   <a:schemeClr val="tx1"/>
                 </a:solidFill>
@@ -4419,8 +4462,17 @@
                 <a:cs typeface="Times New Roman"/>
                 <a:sym typeface="Times New Roman Bold" panose="02020803070505020304" pitchFamily="18" charset="0"/>
               </a:rPr>
-              <a:t>Participants</a:t>
-            </a:r>
+              <a:t>Sources</a:t>
+            </a:r>
+            <a:endParaRPr lang="en-US" sz="3600" b="1" i="1" dirty="0" smtClean="0">
+              <a:solidFill>
+                <a:schemeClr val="tx1"/>
+              </a:solidFill>
+              <a:latin typeface="Times New Roman"/>
+              <a:ea typeface="MS PGothic" panose="020B0600070205080204" pitchFamily="34" charset="-128"/>
+              <a:cs typeface="Times New Roman"/>
+              <a:sym typeface="Times New Roman Bold" panose="02020803070505020304" pitchFamily="18" charset="0"/>
+            </a:endParaRPr>
           </a:p>
           <a:p>
             <a:pPr eaLnBrk="1" hangingPunct="1"/>
@@ -4445,10 +4497,10 @@
                 <a:ea typeface="Calibri"/>
                 <a:cs typeface="Times New Roman"/>
               </a:rPr>
-              <a:t>77 </a:t>
-            </a:r>
-            <a:r>
-              <a:rPr lang="en-US" sz="3600" dirty="0">
+              <a:t>Political n</a:t>
+            </a:r>
+            <a:r>
+              <a:rPr lang="en-US" sz="3600" dirty="0" smtClean="0">
                 <a:solidFill>
                   <a:prstClr val="black"/>
                 </a:solidFill>
@@ -4456,10 +4508,10 @@
                 <a:ea typeface="Calibri"/>
                 <a:cs typeface="Times New Roman"/>
               </a:rPr>
-              <a:t>participants from three different statistics courses at our university were used. Students’ ages typically range from 18-26, and they represent a number of different majors on campus. Two undergraduate classes were sampled</a:t>
-            </a:r>
-            <a:r>
-              <a:rPr lang="en-US" sz="3600" dirty="0" smtClean="0">
+              <a:t>ews articles from four U.S. sources - two preferred by liberals and two by conservatives (Mitchell, et al., 2014). The sources were </a:t>
+            </a:r>
+            <a:r>
+              <a:rPr lang="en-US" sz="3600" i="1" dirty="0" smtClean="0">
                 <a:solidFill>
                   <a:prstClr val="black"/>
                 </a:solidFill>
@@ -4467,10 +4519,10 @@
                 <a:ea typeface="Calibri"/>
                 <a:cs typeface="Times New Roman"/>
               </a:rPr>
-              <a:t>, one of them with 27 students enrolled and the other with 18 students. In </a:t>
-            </a:r>
-            <a:r>
-              <a:rPr lang="en-US" sz="3600" dirty="0">
+              <a:t>The New York Times, NPR, Fox News, and </a:t>
+            </a:r>
+            <a:r>
+              <a:rPr lang="en-US" sz="3600" i="1" dirty="0" err="1" smtClean="0">
                 <a:solidFill>
                   <a:prstClr val="black"/>
                 </a:solidFill>
@@ -4478,63 +4530,16 @@
                 <a:ea typeface="Calibri"/>
                 <a:cs typeface="Times New Roman"/>
               </a:rPr>
-              <a:t>addition </a:t>
-            </a:r>
-            <a:r>
-              <a:rPr lang="en-US" sz="3600" dirty="0" smtClean="0">
-                <a:solidFill>
-                  <a:prstClr val="black"/>
-                </a:solidFill>
-                <a:latin typeface="Times New Roman"/>
-                <a:ea typeface="Calibri"/>
-                <a:cs typeface="Times New Roman"/>
-              </a:rPr>
-              <a:t>to these courses, </a:t>
-            </a:r>
-            <a:r>
-              <a:rPr lang="en-US" sz="3600" dirty="0">
-                <a:solidFill>
-                  <a:prstClr val="black"/>
-                </a:solidFill>
-                <a:latin typeface="Times New Roman"/>
-                <a:ea typeface="Calibri"/>
-                <a:cs typeface="Times New Roman"/>
-              </a:rPr>
-              <a:t>one statistics class </a:t>
-            </a:r>
-            <a:r>
-              <a:rPr lang="en-US" sz="3600" dirty="0" smtClean="0">
-                <a:solidFill>
-                  <a:prstClr val="black"/>
-                </a:solidFill>
-                <a:latin typeface="Times New Roman"/>
-                <a:ea typeface="Calibri"/>
-                <a:cs typeface="Times New Roman"/>
-              </a:rPr>
-              <a:t>was incorporated that included </a:t>
-            </a:r>
-            <a:r>
-              <a:rPr lang="en-US" sz="3600" dirty="0">
-                <a:solidFill>
-                  <a:prstClr val="black"/>
-                </a:solidFill>
-                <a:latin typeface="Times New Roman"/>
-                <a:ea typeface="Calibri"/>
-                <a:cs typeface="Times New Roman"/>
-              </a:rPr>
-              <a:t>both undergraduate and graduate </a:t>
-            </a:r>
-            <a:r>
-              <a:rPr lang="en-US" sz="3600" dirty="0" smtClean="0">
-                <a:solidFill>
-                  <a:prstClr val="black"/>
-                </a:solidFill>
-                <a:latin typeface="Times New Roman"/>
-                <a:ea typeface="Calibri"/>
-                <a:cs typeface="Times New Roman"/>
-              </a:rPr>
-              <a:t>students, with 32 students involved.</a:t>
-            </a:r>
+              <a:t>Breitbart</a:t>
+            </a:r>
+            <a:endParaRPr lang="en-US" sz="3600" dirty="0" smtClean="0">
+              <a:solidFill>
+                <a:prstClr val="black"/>
+              </a:solidFill>
+              <a:latin typeface="Times New Roman"/>
+              <a:ea typeface="Calibri"/>
+              <a:cs typeface="Times New Roman"/>
+            </a:endParaRPr>
           </a:p>
           <a:p>
             <a:pPr>
@@ -4581,185 +4586,230 @@
               <a:buChar char="•"/>
             </a:pPr>
             <a:r>
-              <a:rPr lang="en-US" sz="3600" dirty="0">
-                <a:latin typeface="Times New Roman"/>
-                <a:cs typeface="Times New Roman"/>
-              </a:rPr>
-              <a:t>Before each exam, students were asked to make JOLs on both declarative and procedural information. </a:t>
-            </a:r>
-          </a:p>
-          <a:p>
-            <a:pPr marL="914400" lvl="1" indent="-457200">
-              <a:buFont typeface="Arial" charset="0"/>
-              <a:buChar char="•"/>
-            </a:pPr>
-            <a:r>
-              <a:rPr lang="en-US" sz="3600" dirty="0">
-                <a:latin typeface="Times New Roman"/>
-                <a:cs typeface="Times New Roman"/>
-              </a:rPr>
-              <a:t>“How well do you think you’ll do on the facts portion of this exam?” and “How well do you think you’ll do on the skills portion of this exam?” </a:t>
-            </a:r>
-          </a:p>
-          <a:p>
-            <a:pPr marL="457200" indent="-457200">
-              <a:buFont typeface="Arial" charset="0"/>
-              <a:buChar char="•"/>
-            </a:pPr>
-            <a:r>
-              <a:rPr lang="en-US" sz="3600" dirty="0">
-                <a:latin typeface="Times New Roman"/>
-                <a:cs typeface="Times New Roman"/>
-              </a:rPr>
-              <a:t>Fact questions were defined as containing theoretical concepts, while the skills portion of the exam consisted of questions that asked them to apply that knowledge</a:t>
-            </a:r>
-            <a:r>
               <a:rPr lang="en-US" sz="3600" dirty="0" smtClean="0">
-                <a:latin typeface="Times New Roman"/>
-                <a:cs typeface="Times New Roman"/>
-              </a:rPr>
-              <a:t>.</a:t>
-            </a:r>
-          </a:p>
-          <a:p>
-            <a:pPr marL="1200150" lvl="1" indent="-457200">
-              <a:buFont typeface="Arial" charset="0"/>
-              <a:buChar char="•"/>
-            </a:pPr>
-            <a:r>
-              <a:rPr lang="en-US" sz="3600" dirty="0" smtClean="0">
-                <a:solidFill>
-                  <a:prstClr val="black"/>
+                <a:solidFill>
+                  <a:schemeClr val="tx1"/>
                 </a:solidFill>
                 <a:latin typeface="Times New Roman"/>
                 <a:ea typeface="MS PGothic" panose="020B0600070205080204" pitchFamily="34" charset="-128"/>
                 <a:cs typeface="Times New Roman"/>
                 <a:sym typeface="Times New Roman Bold" panose="02020803070505020304" pitchFamily="18" charset="0"/>
               </a:rPr>
-              <a:t>Facts: Why </a:t>
-            </a:r>
-            <a:r>
-              <a:rPr lang="en-US" sz="3600" dirty="0">
-                <a:solidFill>
-                  <a:prstClr val="black"/>
+              <a:t>Body text of articles was scraped using the </a:t>
+            </a:r>
+            <a:r>
+              <a:rPr lang="en-US" sz="3600" i="1" dirty="0" err="1" smtClean="0">
+                <a:solidFill>
+                  <a:schemeClr val="tx1"/>
                 </a:solidFill>
                 <a:latin typeface="Times New Roman"/>
                 <a:ea typeface="MS PGothic" panose="020B0600070205080204" pitchFamily="34" charset="-128"/>
                 <a:cs typeface="Times New Roman"/>
                 <a:sym typeface="Times New Roman Bold" panose="02020803070505020304" pitchFamily="18" charset="0"/>
               </a:rPr>
-              <a:t>do people use hypothesis testing?  What is the main goal of the procedure?</a:t>
-            </a:r>
-          </a:p>
-          <a:p>
-            <a:pPr marL="1200150" lvl="1" indent="-457200">
-              <a:buFont typeface="Arial" charset="0"/>
-              <a:buChar char="•"/>
-            </a:pPr>
+              <a:t>rvest</a:t>
+            </a:r>
             <a:r>
               <a:rPr lang="en-US" sz="3600" dirty="0" smtClean="0">
-                <a:latin typeface="Times New Roman"/>
-                <a:cs typeface="Times New Roman"/>
-              </a:rPr>
-              <a:t>Skills: </a:t>
-            </a:r>
-            <a:r>
-              <a:rPr lang="en-US" sz="3600" dirty="0">
-                <a:solidFill>
-                  <a:prstClr val="black"/>
+                <a:solidFill>
+                  <a:schemeClr val="tx1"/>
                 </a:solidFill>
                 <a:latin typeface="Times New Roman"/>
                 <a:ea typeface="MS PGothic" panose="020B0600070205080204" pitchFamily="34" charset="-128"/>
                 <a:cs typeface="Times New Roman"/>
                 <a:sym typeface="Times New Roman Bold" panose="02020803070505020304" pitchFamily="18" charset="0"/>
               </a:rPr>
-              <a:t>Create a graph that displays the results of the differences between left and right-handers on word </a:t>
-            </a:r>
-            <a:r>
-              <a:rPr lang="en-US" sz="3600" dirty="0" smtClean="0">
-                <a:solidFill>
-                  <a:prstClr val="black"/>
+              <a:t> library in </a:t>
+            </a:r>
+            <a:r>
+              <a:rPr lang="en-US" sz="3600" i="1" dirty="0" smtClean="0">
+                <a:solidFill>
+                  <a:schemeClr val="tx1"/>
                 </a:solidFill>
                 <a:latin typeface="Times New Roman"/>
                 <a:ea typeface="MS PGothic" panose="020B0600070205080204" pitchFamily="34" charset="-128"/>
                 <a:cs typeface="Times New Roman"/>
                 <a:sym typeface="Times New Roman Bold" panose="02020803070505020304" pitchFamily="18" charset="0"/>
               </a:rPr>
-              <a:t>ratings</a:t>
-            </a:r>
-            <a:r>
-              <a:rPr lang="en-US" sz="3600" dirty="0">
-                <a:solidFill>
-                  <a:prstClr val="black"/>
+              <a:t>R.</a:t>
+            </a:r>
+          </a:p>
+          <a:p>
+            <a:pPr marL="457200" indent="-457200">
+              <a:buFont typeface="Arial" charset="0"/>
+              <a:buChar char="•"/>
+            </a:pPr>
+            <a:r>
+              <a:rPr lang="en-US" sz="3600" dirty="0" smtClean="0">
+                <a:solidFill>
+                  <a:schemeClr val="tx1"/>
                 </a:solidFill>
                 <a:latin typeface="Times New Roman"/>
                 <a:ea typeface="MS PGothic" panose="020B0600070205080204" pitchFamily="34" charset="-128"/>
                 <a:cs typeface="Times New Roman"/>
                 <a:sym typeface="Times New Roman Bold" panose="02020803070505020304" pitchFamily="18" charset="0"/>
               </a:rPr>
-              <a:t>.</a:t>
-            </a:r>
-            <a:endParaRPr lang="en-US" sz="3600" dirty="0">
-              <a:latin typeface="Times New Roman"/>
-              <a:cs typeface="Times New Roman"/>
-            </a:endParaRPr>
-          </a:p>
-          <a:p>
-            <a:pPr marL="457200" lvl="0" indent="-457200">
-              <a:buFont typeface="Arial" charset="0"/>
-              <a:buChar char="•"/>
-            </a:pPr>
-            <a:r>
-              <a:rPr lang="en-US" sz="3600" dirty="0">
-                <a:solidFill>
-                  <a:prstClr val="black"/>
+              <a:t>Using the </a:t>
+            </a:r>
+            <a:r>
+              <a:rPr lang="en-US" sz="3600" i="1" dirty="0" smtClean="0">
+                <a:solidFill>
+                  <a:schemeClr val="tx1"/>
                 </a:solidFill>
                 <a:latin typeface="Times New Roman"/>
                 <a:ea typeface="MS PGothic" panose="020B0600070205080204" pitchFamily="34" charset="-128"/>
                 <a:cs typeface="Times New Roman"/>
                 <a:sym typeface="Times New Roman Bold" panose="02020803070505020304" pitchFamily="18" charset="0"/>
               </a:rPr>
-              <a:t>At the conclusion of the course, a modified version of the SEMLI-S (</a:t>
-            </a:r>
-            <a:r>
-              <a:rPr lang="en-US" sz="3600" dirty="0">
-                <a:latin typeface="Times New Roman" charset="0"/>
-                <a:ea typeface="Times New Roman" charset="0"/>
-                <a:cs typeface="Times New Roman" charset="0"/>
-              </a:rPr>
-              <a:t>Thomas, Anderson, &amp; </a:t>
-            </a:r>
-            <a:r>
-              <a:rPr lang="en-US" sz="3600" dirty="0" err="1">
-                <a:latin typeface="Times New Roman" charset="0"/>
-                <a:ea typeface="Times New Roman" charset="0"/>
-                <a:cs typeface="Times New Roman" charset="0"/>
-              </a:rPr>
-              <a:t>Nahson</a:t>
-            </a:r>
-            <a:r>
-              <a:rPr lang="en-US" sz="3600" dirty="0">
-                <a:latin typeface="Times New Roman" charset="0"/>
-                <a:ea typeface="Times New Roman" charset="0"/>
-                <a:cs typeface="Times New Roman" charset="0"/>
-              </a:rPr>
-              <a:t>, 2008; </a:t>
-            </a:r>
-            <a:r>
-              <a:rPr lang="en-US" sz="3600" dirty="0">
-                <a:solidFill>
-                  <a:prstClr val="black"/>
+              <a:t>tm </a:t>
+            </a:r>
+            <a:r>
+              <a:rPr lang="en-US" sz="3600" dirty="0" smtClean="0">
+                <a:solidFill>
+                  <a:schemeClr val="tx1"/>
                 </a:solidFill>
                 <a:latin typeface="Times New Roman"/>
                 <a:ea typeface="MS PGothic" panose="020B0600070205080204" pitchFamily="34" charset="-128"/>
                 <a:cs typeface="Times New Roman"/>
                 <a:sym typeface="Times New Roman Bold" panose="02020803070505020304" pitchFamily="18" charset="0"/>
               </a:rPr>
-              <a:t>excluding the science specific questions) was administered to measure their metacognitive awareness. </a:t>
+              <a:t>and </a:t>
+            </a:r>
+            <a:r>
+              <a:rPr lang="en-US" sz="3600" i="1" dirty="0" err="1" smtClean="0">
+                <a:solidFill>
+                  <a:schemeClr val="tx1"/>
+                </a:solidFill>
+                <a:latin typeface="Times New Roman"/>
+                <a:ea typeface="MS PGothic" panose="020B0600070205080204" pitchFamily="34" charset="-128"/>
+                <a:cs typeface="Times New Roman"/>
+                <a:sym typeface="Times New Roman Bold" panose="02020803070505020304" pitchFamily="18" charset="0"/>
+              </a:rPr>
+              <a:t>ngram</a:t>
+            </a:r>
+            <a:r>
+              <a:rPr lang="en-US" sz="3600" i="1" dirty="0" smtClean="0">
+                <a:solidFill>
+                  <a:schemeClr val="tx1"/>
+                </a:solidFill>
+                <a:latin typeface="Times New Roman"/>
+                <a:ea typeface="MS PGothic" panose="020B0600070205080204" pitchFamily="34" charset="-128"/>
+                <a:cs typeface="Times New Roman"/>
+                <a:sym typeface="Times New Roman Bold" panose="02020803070505020304" pitchFamily="18" charset="0"/>
+              </a:rPr>
+              <a:t> </a:t>
+            </a:r>
+            <a:r>
+              <a:rPr lang="en-US" sz="3600" dirty="0" smtClean="0">
+                <a:solidFill>
+                  <a:schemeClr val="tx1"/>
+                </a:solidFill>
+                <a:latin typeface="Times New Roman"/>
+                <a:ea typeface="MS PGothic" panose="020B0600070205080204" pitchFamily="34" charset="-128"/>
+                <a:cs typeface="Times New Roman"/>
+                <a:sym typeface="Times New Roman Bold" panose="02020803070505020304" pitchFamily="18" charset="0"/>
+              </a:rPr>
+              <a:t>packages, text was stemmed and processed to remove blanks, duplicates, punctuation, and capitalization</a:t>
+            </a:r>
+          </a:p>
+          <a:p>
+            <a:pPr marL="1200150" lvl="1" indent="-457200">
+              <a:buFont typeface="Arial" charset="0"/>
+              <a:buChar char="•"/>
+            </a:pPr>
+            <a:r>
+              <a:rPr lang="en-US" sz="3600" dirty="0" smtClean="0">
+                <a:solidFill>
+                  <a:schemeClr val="tx1"/>
+                </a:solidFill>
+                <a:latin typeface="Times New Roman"/>
+                <a:ea typeface="MS PGothic" panose="020B0600070205080204" pitchFamily="34" charset="-128"/>
+                <a:cs typeface="Times New Roman"/>
+                <a:sym typeface="Times New Roman Bold" panose="02020803070505020304" pitchFamily="18" charset="0"/>
+              </a:rPr>
+              <a:t>The same procedure was applied to the words in the </a:t>
+            </a:r>
+            <a:r>
+              <a:rPr lang="en-US" sz="3600" dirty="0" err="1" smtClean="0">
+                <a:solidFill>
+                  <a:schemeClr val="tx1"/>
+                </a:solidFill>
+                <a:latin typeface="Times New Roman"/>
+                <a:ea typeface="MS PGothic" panose="020B0600070205080204" pitchFamily="34" charset="-128"/>
+                <a:cs typeface="Times New Roman"/>
+                <a:sym typeface="Times New Roman Bold" panose="02020803070505020304" pitchFamily="18" charset="0"/>
+              </a:rPr>
+              <a:t>Warriner</a:t>
+            </a:r>
+            <a:r>
+              <a:rPr lang="en-US" sz="3600" dirty="0" smtClean="0">
+                <a:solidFill>
+                  <a:schemeClr val="tx1"/>
+                </a:solidFill>
+                <a:latin typeface="Times New Roman"/>
+                <a:ea typeface="MS PGothic" panose="020B0600070205080204" pitchFamily="34" charset="-128"/>
+                <a:cs typeface="Times New Roman"/>
+                <a:sym typeface="Times New Roman Bold" panose="02020803070505020304" pitchFamily="18" charset="0"/>
+              </a:rPr>
+              <a:t>, et al. dataset of affective ratings for 13,915 English lemmas.</a:t>
+            </a:r>
+          </a:p>
+          <a:p>
+            <a:pPr marL="457200" indent="-457200">
+              <a:buFont typeface="Arial" charset="0"/>
+              <a:buChar char="•"/>
+            </a:pPr>
+            <a:r>
+              <a:rPr lang="en-US" sz="3600" dirty="0" smtClean="0">
+                <a:solidFill>
+                  <a:schemeClr val="tx1"/>
+                </a:solidFill>
+                <a:latin typeface="Times New Roman"/>
+                <a:ea typeface="MS PGothic" panose="020B0600070205080204" pitchFamily="34" charset="-128"/>
+                <a:cs typeface="Times New Roman"/>
+                <a:sym typeface="Times New Roman Bold" panose="02020803070505020304" pitchFamily="18" charset="0"/>
+              </a:rPr>
+              <a:t>Problem: MFD does not account for valence </a:t>
+            </a:r>
+            <a:r>
+              <a:rPr lang="mr-IN" sz="3600" dirty="0" smtClean="0">
+                <a:solidFill>
+                  <a:schemeClr val="tx1"/>
+                </a:solidFill>
+                <a:latin typeface="Times New Roman"/>
+                <a:ea typeface="MS PGothic" panose="020B0600070205080204" pitchFamily="34" charset="-128"/>
+                <a:cs typeface="Times New Roman"/>
+                <a:sym typeface="Times New Roman Bold" panose="02020803070505020304" pitchFamily="18" charset="0"/>
+              </a:rPr>
+              <a:t>–</a:t>
+            </a:r>
+            <a:r>
+              <a:rPr lang="en-US" sz="3600" dirty="0" smtClean="0">
+                <a:solidFill>
+                  <a:schemeClr val="tx1"/>
+                </a:solidFill>
+                <a:latin typeface="Times New Roman"/>
+                <a:ea typeface="MS PGothic" panose="020B0600070205080204" pitchFamily="34" charset="-128"/>
+                <a:cs typeface="Times New Roman"/>
+                <a:sym typeface="Times New Roman Bold" panose="02020803070505020304" pitchFamily="18" charset="0"/>
+              </a:rPr>
+              <a:t> it assumes any occurrence is positive endorsement. Also, </a:t>
+            </a:r>
+            <a:r>
+              <a:rPr lang="en-US" sz="3600" smtClean="0">
+                <a:solidFill>
+                  <a:schemeClr val="tx1"/>
+                </a:solidFill>
+                <a:latin typeface="Times New Roman"/>
+                <a:ea typeface="MS PGothic" panose="020B0600070205080204" pitchFamily="34" charset="-128"/>
+                <a:cs typeface="Times New Roman"/>
+                <a:sym typeface="Times New Roman Bold" panose="02020803070505020304" pitchFamily="18" charset="0"/>
+              </a:rPr>
+              <a:t>it is not as </a:t>
             </a:r>
             <a:endParaRPr lang="en-US" sz="3600" dirty="0" smtClean="0">
               <a:solidFill>
-                <a:prstClr val="black"/>
+                <a:schemeClr val="tx1"/>
               </a:solidFill>
               <a:latin typeface="Times New Roman"/>
               <a:ea typeface="MS PGothic" panose="020B0600070205080204" pitchFamily="34" charset="-128"/>
@@ -4768,7 +4818,78 @@
             </a:endParaRPr>
           </a:p>
           <a:p>
-            <a:pPr lvl="0"/>
+            <a:pPr marL="457200" indent="-457200">
+              <a:buFont typeface="Arial" charset="0"/>
+              <a:buChar char="•"/>
+            </a:pPr>
+            <a:r>
+              <a:rPr lang="en-US" sz="3600" dirty="0" smtClean="0">
+                <a:solidFill>
+                  <a:schemeClr val="tx1"/>
+                </a:solidFill>
+                <a:latin typeface="Times New Roman"/>
+                <a:ea typeface="MS PGothic" panose="020B0600070205080204" pitchFamily="34" charset="-128"/>
+                <a:cs typeface="Times New Roman"/>
+                <a:sym typeface="Times New Roman Bold" panose="02020803070505020304" pitchFamily="18" charset="0"/>
+              </a:rPr>
+              <a:t>Article words were matched up with MFD counterparts, valence (pleasantness) value, and percent occurrence, which was multiplied by </a:t>
+            </a:r>
+            <a:r>
+              <a:rPr lang="en-US" sz="3600" i="1" dirty="0" smtClean="0">
+                <a:solidFill>
+                  <a:schemeClr val="tx1"/>
+                </a:solidFill>
+                <a:latin typeface="Times New Roman"/>
+                <a:ea typeface="MS PGothic" panose="020B0600070205080204" pitchFamily="34" charset="-128"/>
+                <a:cs typeface="Times New Roman"/>
+                <a:sym typeface="Times New Roman Bold" panose="02020803070505020304" pitchFamily="18" charset="0"/>
+              </a:rPr>
+              <a:t>z</a:t>
+            </a:r>
+            <a:r>
+              <a:rPr lang="en-US" sz="3600" dirty="0" smtClean="0">
+                <a:solidFill>
+                  <a:schemeClr val="tx1"/>
+                </a:solidFill>
+                <a:latin typeface="Times New Roman"/>
+                <a:ea typeface="MS PGothic" panose="020B0600070205080204" pitchFamily="34" charset="-128"/>
+                <a:cs typeface="Times New Roman"/>
+                <a:sym typeface="Times New Roman Bold" panose="02020803070505020304" pitchFamily="18" charset="0"/>
+              </a:rPr>
+              <a:t>-scored valence (to eliminate ambiguity regarding valence direction)</a:t>
+            </a:r>
+          </a:p>
+          <a:p>
+            <a:pPr marL="457200" indent="-457200">
+              <a:buFont typeface="Arial" charset="0"/>
+              <a:buChar char="•"/>
+            </a:pPr>
+            <a:endParaRPr lang="en-US" sz="3600" dirty="0" smtClean="0">
+              <a:solidFill>
+                <a:schemeClr val="tx1"/>
+              </a:solidFill>
+              <a:latin typeface="Times New Roman"/>
+              <a:ea typeface="MS PGothic" panose="020B0600070205080204" pitchFamily="34" charset="-128"/>
+              <a:cs typeface="Times New Roman"/>
+              <a:sym typeface="Times New Roman Bold" panose="02020803070505020304" pitchFamily="18" charset="0"/>
+            </a:endParaRPr>
+          </a:p>
+          <a:p>
+            <a:pPr marL="457200" indent="-457200">
+              <a:buFont typeface="Arial" charset="0"/>
+              <a:buChar char="•"/>
+            </a:pPr>
+            <a:endParaRPr lang="en-US" sz="3600" i="1" dirty="0">
+              <a:solidFill>
+                <a:schemeClr val="tx1"/>
+              </a:solidFill>
+              <a:latin typeface="Times New Roman"/>
+              <a:ea typeface="MS PGothic" panose="020B0600070205080204" pitchFamily="34" charset="-128"/>
+              <a:cs typeface="Times New Roman"/>
+              <a:sym typeface="Times New Roman Bold" panose="02020803070505020304" pitchFamily="18" charset="0"/>
+            </a:endParaRPr>
+          </a:p>
+          <a:p>
             <a:r>
               <a:rPr lang="en-US" sz="3600" b="1" i="1" dirty="0" smtClean="0">
                 <a:solidFill>
@@ -4798,7 +4919,15 @@
                 <a:ea typeface="Times New Roman" charset="0"/>
                 <a:cs typeface="Times New Roman" charset="0"/>
               </a:rPr>
-              <a:t>A multilevel model controlling for correlated error of participant and item was used to analyze the data. </a:t>
+              <a:t>A </a:t>
+            </a:r>
+            <a:r>
+              <a:rPr lang="en-US" sz="3600" dirty="0" smtClean="0">
+                <a:latin typeface="Times New Roman" charset="0"/>
+                <a:ea typeface="Times New Roman" charset="0"/>
+                <a:cs typeface="Times New Roman" charset="0"/>
+              </a:rPr>
+              <a:t>multilevel model controlling for correlated error of participant and item was used to analyze the data. </a:t>
             </a:r>
           </a:p>
           <a:p>
@@ -4832,41 +4961,6 @@
             </a:r>
             <a:endParaRPr lang="en-US" sz="3600" b="1" i="1" dirty="0">
               <a:latin typeface="Times New Roman"/>
-              <a:cs typeface="Times New Roman"/>
-            </a:endParaRPr>
-          </a:p>
-          <a:p>
-            <a:pPr marL="457200" indent="-457200">
-              <a:buFont typeface="Arial" charset="0"/>
-              <a:buChar char="•"/>
-            </a:pPr>
-            <a:r>
-              <a:rPr lang="en-US" sz="3600" dirty="0" smtClean="0">
-                <a:latin typeface="Times New Roman"/>
-                <a:ea typeface="Times New Roman" charset="0"/>
-                <a:cs typeface="Times New Roman"/>
-              </a:rPr>
-              <a:t>Item scores for each exam were </a:t>
-            </a:r>
-            <a:r>
-              <a:rPr lang="en-US" sz="3600" dirty="0">
-                <a:latin typeface="Times New Roman"/>
-                <a:ea typeface="Times New Roman" charset="0"/>
-                <a:cs typeface="Times New Roman"/>
-              </a:rPr>
-              <a:t>considered the dependent variable</a:t>
-            </a:r>
-            <a:r>
-              <a:rPr lang="en-US" sz="3600" dirty="0" smtClean="0">
-                <a:latin typeface="Times New Roman"/>
-                <a:ea typeface="Times New Roman" charset="0"/>
-                <a:cs typeface="Times New Roman"/>
-              </a:rPr>
-              <a:t>.</a:t>
-            </a:r>
-            <a:endParaRPr lang="en-US" sz="3600" dirty="0">
-              <a:latin typeface="Times New Roman"/>
-              <a:ea typeface="Times New Roman" charset="0"/>
               <a:cs typeface="Times New Roman"/>
             </a:endParaRPr>
           </a:p>
@@ -4894,14 +4988,14 @@
           </a:ln>
           <a:extLst>
             <a:ext uri="{909E8E84-426E-40dd-AFC4-6F175D3DCCD1}">
-              <a14:hiddenFill xmlns="" xmlns:a14="http://schemas.microsoft.com/office/drawing/2010/main">
+              <a14:hiddenFill xmlns:a14="http://schemas.microsoft.com/office/drawing/2010/main">
                 <a:solidFill>
                   <a:srgbClr val="FFFFFF"/>
                 </a:solidFill>
               </a14:hiddenFill>
             </a:ext>
             <a:ext uri="{91240B29-F687-4f45-9708-019B960494DF}">
-              <a14:hiddenLine xmlns="" xmlns:a14="http://schemas.microsoft.com/office/drawing/2010/main" w="12700" cap="rnd">
+              <a14:hiddenLine xmlns:a14="http://schemas.microsoft.com/office/drawing/2010/main" w="12700" cap="rnd">
                 <a:solidFill>
                   <a:schemeClr val="tx1"/>
                 </a:solidFill>
@@ -5195,7 +5289,7 @@
           </a:ln>
           <a:extLst>
             <a:ext uri="{909E8E84-426E-40dd-AFC4-6F175D3DCCD1}">
-              <a14:hiddenFill xmlns="" xmlns:a14="http://schemas.microsoft.com/office/drawing/2010/main">
+              <a14:hiddenFill xmlns:a14="http://schemas.microsoft.com/office/drawing/2010/main">
                 <a:noFill/>
               </a14:hiddenFill>
             </a:ext>
@@ -5245,7 +5339,7 @@
           </a:ln>
           <a:extLst>
             <a:ext uri="{909E8E84-426E-40dd-AFC4-6F175D3DCCD1}">
-              <a14:hiddenFill xmlns="" xmlns:a14="http://schemas.microsoft.com/office/drawing/2010/main">
+              <a14:hiddenFill xmlns:a14="http://schemas.microsoft.com/office/drawing/2010/main">
                 <a:noFill/>
               </a14:hiddenFill>
             </a:ext>
@@ -9254,15 +9348,7 @@
                 <a:ea typeface="Times New Roman" charset="0"/>
                 <a:cs typeface="Times New Roman" charset="0"/>
               </a:rPr>
-              <a:t>(see handout for table</a:t>
-            </a:r>
-            <a:r>
-              <a:rPr lang="en-US" sz="3600" b="1" dirty="0" smtClean="0">
-                <a:latin typeface="Times New Roman" charset="0"/>
-                <a:ea typeface="Times New Roman" charset="0"/>
-                <a:cs typeface="Times New Roman" charset="0"/>
-              </a:rPr>
-              <a:t>)</a:t>
+              <a:t>(see handout for table)</a:t>
             </a:r>
             <a:endParaRPr lang="en-US" sz="3600" i="1" dirty="0" smtClean="0">
               <a:latin typeface="Times New Roman" charset="0"/>
@@ -9335,7 +9421,7 @@
   <p:timing>
     <p:tnLst>
       <p:par>
-        <p:cTn id="1" dur="indefinite" restart="never" nodeType="tmRoot"/>
+        <p:cTn xmlns:p14="http://schemas.microsoft.com/office/powerpoint/2010/main" id="1" dur="indefinite" restart="never" nodeType="tmRoot"/>
       </p:par>
     </p:tnLst>
   </p:timing>
@@ -9597,7 +9683,7 @@
   <a:extraClrSchemeLst/>
   <a:extLst>
     <a:ext uri="{05A4C25C-085E-4340-85A3-A5531E510DB2}">
-      <thm15:themeFamily xmlns:thm15="http://schemas.microsoft.com/office/thememl/2012/main" name="Office Theme" id="{62F939B6-93AF-4DB8-9C6B-D6C7DFDC589F}" vid="{AE6F2518-B084-4896-AF52-66CC2144AA26}"/>
+      <thm15:themeFamily xmlns:thm15="http://schemas.microsoft.com/office/thememl/2012/main" xmlns="" name="Office Theme" id="{62F939B6-93AF-4DB8-9C6B-D6C7DFDC589F}" vid="{AE6F2518-B084-4896-AF52-66CC2144AA26}"/>
     </a:ext>
   </a:extLst>
 </a:theme>
@@ -9858,7 +9944,7 @@
   <a:extraClrSchemeLst/>
   <a:extLst>
     <a:ext uri="{05A4C25C-085E-4340-85A3-A5531E510DB2}">
-      <thm15:themeFamily xmlns:thm15="http://schemas.microsoft.com/office/thememl/2012/main" name="Office Theme" id="{62F939B6-93AF-4DB8-9C6B-D6C7DFDC589F}" vid="{4A3C46E8-61CC-4603-A589-7422A47A8E4A}"/>
+      <thm15:themeFamily xmlns:thm15="http://schemas.microsoft.com/office/thememl/2012/main" xmlns="" name="Office Theme" id="{62F939B6-93AF-4DB8-9C6B-D6C7DFDC589F}" vid="{4A3C46E8-61CC-4603-A589-7422A47A8E4A}"/>
     </a:ext>
   </a:extLst>
 </a:theme>

</xml_diff>